<commit_message>
commit final meme si reste quelque bug
</commit_message>
<xml_diff>
--- a/src/Layout/Visuel_ecran.pptx
+++ b/src/Layout/Visuel_ecran.pptx
@@ -16,6 +16,7 @@
     <p:sldId id="265" r:id="rId10"/>
     <p:sldId id="266" r:id="rId11"/>
     <p:sldId id="270" r:id="rId12"/>
+    <p:sldId id="271" r:id="rId13"/>
   </p:sldIdLst>
   <p:sldSz cx="12192000" cy="6858000"/>
   <p:notesSz cx="6858000" cy="9144000"/>
@@ -253,7 +254,7 @@
           <a:p>
             <a:fld id="{7833CD60-A37C-4C79-8A65-B2C978C46171}" type="datetimeFigureOut">
               <a:rPr lang="en-US" smtClean="0"/>
-              <a:t>5/8/2016</a:t>
+              <a:t>5/9/2016</a:t>
             </a:fld>
             <a:endParaRPr lang="en-US"/>
           </a:p>
@@ -423,7 +424,7 @@
           <a:p>
             <a:fld id="{7833CD60-A37C-4C79-8A65-B2C978C46171}" type="datetimeFigureOut">
               <a:rPr lang="en-US" smtClean="0"/>
-              <a:t>5/8/2016</a:t>
+              <a:t>5/9/2016</a:t>
             </a:fld>
             <a:endParaRPr lang="en-US"/>
           </a:p>
@@ -603,7 +604,7 @@
           <a:p>
             <a:fld id="{7833CD60-A37C-4C79-8A65-B2C978C46171}" type="datetimeFigureOut">
               <a:rPr lang="en-US" smtClean="0"/>
-              <a:t>5/8/2016</a:t>
+              <a:t>5/9/2016</a:t>
             </a:fld>
             <a:endParaRPr lang="en-US"/>
           </a:p>
@@ -773,7 +774,7 @@
           <a:p>
             <a:fld id="{7833CD60-A37C-4C79-8A65-B2C978C46171}" type="datetimeFigureOut">
               <a:rPr lang="en-US" smtClean="0"/>
-              <a:t>5/8/2016</a:t>
+              <a:t>5/9/2016</a:t>
             </a:fld>
             <a:endParaRPr lang="en-US"/>
           </a:p>
@@ -1019,7 +1020,7 @@
           <a:p>
             <a:fld id="{7833CD60-A37C-4C79-8A65-B2C978C46171}" type="datetimeFigureOut">
               <a:rPr lang="en-US" smtClean="0"/>
-              <a:t>5/8/2016</a:t>
+              <a:t>5/9/2016</a:t>
             </a:fld>
             <a:endParaRPr lang="en-US"/>
           </a:p>
@@ -1251,7 +1252,7 @@
           <a:p>
             <a:fld id="{7833CD60-A37C-4C79-8A65-B2C978C46171}" type="datetimeFigureOut">
               <a:rPr lang="en-US" smtClean="0"/>
-              <a:t>5/8/2016</a:t>
+              <a:t>5/9/2016</a:t>
             </a:fld>
             <a:endParaRPr lang="en-US"/>
           </a:p>
@@ -1618,7 +1619,7 @@
           <a:p>
             <a:fld id="{7833CD60-A37C-4C79-8A65-B2C978C46171}" type="datetimeFigureOut">
               <a:rPr lang="en-US" smtClean="0"/>
-              <a:t>5/8/2016</a:t>
+              <a:t>5/9/2016</a:t>
             </a:fld>
             <a:endParaRPr lang="en-US"/>
           </a:p>
@@ -1736,7 +1737,7 @@
           <a:p>
             <a:fld id="{7833CD60-A37C-4C79-8A65-B2C978C46171}" type="datetimeFigureOut">
               <a:rPr lang="en-US" smtClean="0"/>
-              <a:t>5/8/2016</a:t>
+              <a:t>5/9/2016</a:t>
             </a:fld>
             <a:endParaRPr lang="en-US"/>
           </a:p>
@@ -1831,7 +1832,7 @@
           <a:p>
             <a:fld id="{7833CD60-A37C-4C79-8A65-B2C978C46171}" type="datetimeFigureOut">
               <a:rPr lang="en-US" smtClean="0"/>
-              <a:t>5/8/2016</a:t>
+              <a:t>5/9/2016</a:t>
             </a:fld>
             <a:endParaRPr lang="en-US"/>
           </a:p>
@@ -2108,7 +2109,7 @@
           <a:p>
             <a:fld id="{7833CD60-A37C-4C79-8A65-B2C978C46171}" type="datetimeFigureOut">
               <a:rPr lang="en-US" smtClean="0"/>
-              <a:t>5/8/2016</a:t>
+              <a:t>5/9/2016</a:t>
             </a:fld>
             <a:endParaRPr lang="en-US"/>
           </a:p>
@@ -2361,7 +2362,7 @@
           <a:p>
             <a:fld id="{7833CD60-A37C-4C79-8A65-B2C978C46171}" type="datetimeFigureOut">
               <a:rPr lang="en-US" smtClean="0"/>
-              <a:t>5/8/2016</a:t>
+              <a:t>5/9/2016</a:t>
             </a:fld>
             <a:endParaRPr lang="en-US"/>
           </a:p>
@@ -2574,7 +2575,7 @@
           <a:p>
             <a:fld id="{7833CD60-A37C-4C79-8A65-B2C978C46171}" type="datetimeFigureOut">
               <a:rPr lang="en-US" smtClean="0"/>
-              <a:t>5/8/2016</a:t>
+              <a:t>5/9/2016</a:t>
             </a:fld>
             <a:endParaRPr lang="en-US"/>
           </a:p>
@@ -3014,8 +3015,8 @@
         </p:nvSpPr>
         <p:spPr/>
         <p:txBody>
-          <a:bodyPr>
-            <a:normAutofit fontScale="85000" lnSpcReduction="20000"/>
+          <a:bodyPr numCol="2">
+            <a:normAutofit/>
           </a:bodyPr>
           <a:lstStyle/>
           <a:p>
@@ -3025,8 +3026,9 @@
             </a:pPr>
             <a:r>
               <a:rPr lang="fr-FR" dirty="0" smtClean="0"/>
-              <a:t>sommaire</a:t>
-            </a:r>
+              <a:t>Login</a:t>
+            </a:r>
+            <a:endParaRPr lang="fr-FR" dirty="0" smtClean="0"/>
           </a:p>
           <a:p>
             <a:pPr marL="514350" indent="-514350">
@@ -3035,7 +3037,7 @@
             </a:pPr>
             <a:r>
               <a:rPr lang="fr-FR" dirty="0" smtClean="0"/>
-              <a:t>Login</a:t>
+              <a:t>Menu</a:t>
             </a:r>
           </a:p>
           <a:p>
@@ -3045,7 +3047,7 @@
             </a:pPr>
             <a:r>
               <a:rPr lang="fr-FR" dirty="0" smtClean="0"/>
-              <a:t>Menu</a:t>
+              <a:t>Emprunteur</a:t>
             </a:r>
           </a:p>
           <a:p>
@@ -3055,7 +3057,7 @@
             </a:pPr>
             <a:r>
               <a:rPr lang="fr-FR" dirty="0" smtClean="0"/>
-              <a:t>Emprunteur</a:t>
+              <a:t>Devis</a:t>
             </a:r>
           </a:p>
           <a:p>
@@ -3065,7 +3067,7 @@
             </a:pPr>
             <a:r>
               <a:rPr lang="fr-FR" dirty="0" smtClean="0"/>
-              <a:t>Devis</a:t>
+              <a:t>Véhicule</a:t>
             </a:r>
           </a:p>
           <a:p>
@@ -3075,7 +3077,7 @@
             </a:pPr>
             <a:r>
               <a:rPr lang="fr-FR" dirty="0" smtClean="0"/>
-              <a:t>Véhicule</a:t>
+              <a:t>Catalogue</a:t>
             </a:r>
           </a:p>
           <a:p>
@@ -3085,7 +3087,7 @@
             </a:pPr>
             <a:r>
               <a:rPr lang="fr-FR" dirty="0" smtClean="0"/>
-              <a:t>Catalogue</a:t>
+              <a:t>Formulaire Emprunteur</a:t>
             </a:r>
           </a:p>
           <a:p>
@@ -3095,7 +3097,7 @@
             </a:pPr>
             <a:r>
               <a:rPr lang="fr-FR" dirty="0" smtClean="0"/>
-              <a:t>Formulaire Emprunteur</a:t>
+              <a:t>Formulaire Véhicule</a:t>
             </a:r>
           </a:p>
           <a:p>
@@ -3105,7 +3107,7 @@
             </a:pPr>
             <a:r>
               <a:rPr lang="fr-FR" dirty="0" smtClean="0"/>
-              <a:t>Formulaire Véhicule</a:t>
+              <a:t>Formulaire Devis</a:t>
             </a:r>
           </a:p>
           <a:p>
@@ -3115,7 +3117,11 @@
             </a:pPr>
             <a:r>
               <a:rPr lang="fr-FR" dirty="0" smtClean="0"/>
-              <a:t>Formulaire Devis</a:t>
+              <a:t>Retour </a:t>
+            </a:r>
+            <a:r>
+              <a:rPr lang="fr-FR" dirty="0" smtClean="0"/>
+              <a:t>véhicule</a:t>
             </a:r>
           </a:p>
           <a:p>
@@ -3125,7 +3131,11 @@
             </a:pPr>
             <a:r>
               <a:rPr lang="fr-FR" dirty="0" smtClean="0"/>
-              <a:t>Retour véhicule</a:t>
+              <a:t>Supprimer </a:t>
+            </a:r>
+            <a:r>
+              <a:rPr lang="fr-FR" dirty="0" err="1" smtClean="0"/>
+              <a:t>vehicule</a:t>
             </a:r>
             <a:endParaRPr lang="en-US" dirty="0"/>
           </a:p>
@@ -3861,6 +3871,426 @@
     <p:extLst>
       <p:ext uri="{BB962C8B-B14F-4D97-AF65-F5344CB8AC3E}">
         <p14:creationId xmlns:p14="http://schemas.microsoft.com/office/powerpoint/2010/main" val="165452906"/>
+      </p:ext>
+    </p:extLst>
+  </p:cSld>
+  <p:clrMapOvr>
+    <a:masterClrMapping/>
+  </p:clrMapOvr>
+  <p:timing>
+    <p:tnLst>
+      <p:par>
+        <p:cTn id="1" dur="indefinite" restart="never" nodeType="tmRoot"/>
+      </p:par>
+    </p:tnLst>
+  </p:timing>
+</p:sld>
+</file>
+
+<file path=ppt/slides/slide12.xml><?xml version="1.0" encoding="utf-8"?>
+<p:sld xmlns:a="http://schemas.openxmlformats.org/drawingml/2006/main" xmlns:r="http://schemas.openxmlformats.org/officeDocument/2006/relationships" xmlns:p="http://schemas.openxmlformats.org/presentationml/2006/main">
+  <p:cSld>
+    <p:spTree>
+      <p:nvGrpSpPr>
+        <p:cNvPr id="1" name=""/>
+        <p:cNvGrpSpPr/>
+        <p:nvPr/>
+      </p:nvGrpSpPr>
+      <p:grpSpPr>
+        <a:xfrm>
+          <a:off x="0" y="0"/>
+          <a:ext cx="0" cy="0"/>
+          <a:chOff x="0" y="0"/>
+          <a:chExt cx="0" cy="0"/>
+        </a:xfrm>
+      </p:grpSpPr>
+      <p:sp>
+        <p:nvSpPr>
+          <p:cNvPr id="2" name="Rectangle 1"/>
+          <p:cNvSpPr/>
+          <p:nvPr/>
+        </p:nvSpPr>
+        <p:spPr>
+          <a:xfrm>
+            <a:off x="962526" y="577516"/>
+            <a:ext cx="10635916" cy="5694947"/>
+          </a:xfrm>
+          <a:prstGeom prst="rect">
+            <a:avLst/>
+          </a:prstGeom>
+          <a:noFill/>
+        </p:spPr>
+        <p:style>
+          <a:lnRef idx="2">
+            <a:schemeClr val="accent1">
+              <a:shade val="50000"/>
+            </a:schemeClr>
+          </a:lnRef>
+          <a:fillRef idx="1">
+            <a:schemeClr val="accent1"/>
+          </a:fillRef>
+          <a:effectRef idx="0">
+            <a:schemeClr val="accent1"/>
+          </a:effectRef>
+          <a:fontRef idx="minor">
+            <a:schemeClr val="lt1"/>
+          </a:fontRef>
+        </p:style>
+        <p:txBody>
+          <a:bodyPr rtlCol="0" anchor="ctr"/>
+          <a:lstStyle/>
+          <a:p>
+            <a:pPr algn="ctr"/>
+            <a:endParaRPr lang="en-US"/>
+          </a:p>
+        </p:txBody>
+      </p:sp>
+      <p:cxnSp>
+        <p:nvCxnSpPr>
+          <p:cNvPr id="4" name="Connecteur droit 3"/>
+          <p:cNvCxnSpPr/>
+          <p:nvPr/>
+        </p:nvCxnSpPr>
+        <p:spPr>
+          <a:xfrm flipV="1">
+            <a:off x="962526" y="1507958"/>
+            <a:ext cx="10635916" cy="48126"/>
+          </a:xfrm>
+          <a:prstGeom prst="line">
+            <a:avLst/>
+          </a:prstGeom>
+        </p:spPr>
+        <p:style>
+          <a:lnRef idx="1">
+            <a:schemeClr val="accent1"/>
+          </a:lnRef>
+          <a:fillRef idx="0">
+            <a:schemeClr val="accent1"/>
+          </a:fillRef>
+          <a:effectRef idx="0">
+            <a:schemeClr val="accent1"/>
+          </a:effectRef>
+          <a:fontRef idx="minor">
+            <a:schemeClr val="tx1"/>
+          </a:fontRef>
+        </p:style>
+      </p:cxnSp>
+      <p:cxnSp>
+        <p:nvCxnSpPr>
+          <p:cNvPr id="6" name="Connecteur droit 5"/>
+          <p:cNvCxnSpPr/>
+          <p:nvPr/>
+        </p:nvCxnSpPr>
+        <p:spPr>
+          <a:xfrm>
+            <a:off x="962526" y="5197642"/>
+            <a:ext cx="10635916" cy="32084"/>
+          </a:xfrm>
+          <a:prstGeom prst="line">
+            <a:avLst/>
+          </a:prstGeom>
+        </p:spPr>
+        <p:style>
+          <a:lnRef idx="1">
+            <a:schemeClr val="accent1"/>
+          </a:lnRef>
+          <a:fillRef idx="0">
+            <a:schemeClr val="accent1"/>
+          </a:fillRef>
+          <a:effectRef idx="0">
+            <a:schemeClr val="accent1"/>
+          </a:effectRef>
+          <a:fontRef idx="minor">
+            <a:schemeClr val="tx1"/>
+          </a:fontRef>
+        </p:style>
+      </p:cxnSp>
+      <p:sp>
+        <p:nvSpPr>
+          <p:cNvPr id="3" name="ZoneTexte 2"/>
+          <p:cNvSpPr txBox="1"/>
+          <p:nvPr/>
+        </p:nvSpPr>
+        <p:spPr>
+          <a:xfrm>
+            <a:off x="4823584" y="901025"/>
+            <a:ext cx="2996526" cy="461665"/>
+          </a:xfrm>
+          <a:prstGeom prst="rect">
+            <a:avLst/>
+          </a:prstGeom>
+          <a:noFill/>
+        </p:spPr>
+        <p:txBody>
+          <a:bodyPr wrap="none" rtlCol="0">
+            <a:spAutoFit/>
+          </a:bodyPr>
+          <a:lstStyle/>
+          <a:p>
+            <a:r>
+              <a:rPr lang="fr-FR" sz="2400" dirty="0" smtClean="0"/>
+              <a:t>Supprimer un </a:t>
+            </a:r>
+            <a:r>
+              <a:rPr lang="fr-FR" sz="2400" dirty="0"/>
+              <a:t>véhicule</a:t>
+            </a:r>
+            <a:endParaRPr lang="en-US" sz="2400" dirty="0"/>
+          </a:p>
+        </p:txBody>
+      </p:sp>
+      <p:sp>
+        <p:nvSpPr>
+          <p:cNvPr id="5" name="ZoneTexte 4"/>
+          <p:cNvSpPr txBox="1"/>
+          <p:nvPr/>
+        </p:nvSpPr>
+        <p:spPr>
+          <a:xfrm>
+            <a:off x="5670787" y="5501635"/>
+            <a:ext cx="1123978" cy="461665"/>
+          </a:xfrm>
+          <a:prstGeom prst="rect">
+            <a:avLst/>
+          </a:prstGeom>
+          <a:noFill/>
+        </p:spPr>
+        <p:txBody>
+          <a:bodyPr wrap="square" rtlCol="0">
+            <a:spAutoFit/>
+          </a:bodyPr>
+          <a:lstStyle/>
+          <a:p>
+            <a:r>
+              <a:rPr lang="fr-FR" sz="2400" dirty="0" smtClean="0"/>
+              <a:t>Retour</a:t>
+            </a:r>
+            <a:endParaRPr lang="en-US" sz="2400" dirty="0"/>
+          </a:p>
+        </p:txBody>
+      </p:sp>
+      <p:sp>
+        <p:nvSpPr>
+          <p:cNvPr id="18" name="ZoneTexte 17"/>
+          <p:cNvSpPr txBox="1"/>
+          <p:nvPr/>
+        </p:nvSpPr>
+        <p:spPr>
+          <a:xfrm>
+            <a:off x="6651321" y="5576148"/>
+            <a:ext cx="301686" cy="369332"/>
+          </a:xfrm>
+          <a:prstGeom prst="rect">
+            <a:avLst/>
+          </a:prstGeom>
+          <a:noFill/>
+        </p:spPr>
+        <p:txBody>
+          <a:bodyPr wrap="none" rtlCol="0">
+            <a:spAutoFit/>
+          </a:bodyPr>
+          <a:lstStyle/>
+          <a:p>
+            <a:r>
+              <a:rPr lang="fr-FR" dirty="0" smtClean="0">
+                <a:solidFill>
+                  <a:srgbClr val="FF0000"/>
+                </a:solidFill>
+              </a:rPr>
+              <a:t>3</a:t>
+            </a:r>
+            <a:endParaRPr lang="en-US" dirty="0">
+              <a:solidFill>
+                <a:srgbClr val="FF0000"/>
+              </a:solidFill>
+            </a:endParaRPr>
+          </a:p>
+        </p:txBody>
+      </p:sp>
+      <p:sp>
+        <p:nvSpPr>
+          <p:cNvPr id="27" name="ZoneTexte 26"/>
+          <p:cNvSpPr txBox="1"/>
+          <p:nvPr/>
+        </p:nvSpPr>
+        <p:spPr>
+          <a:xfrm>
+            <a:off x="5805294" y="3744216"/>
+            <a:ext cx="837089" cy="369332"/>
+          </a:xfrm>
+          <a:prstGeom prst="rect">
+            <a:avLst/>
+          </a:prstGeom>
+          <a:noFill/>
+        </p:spPr>
+        <p:txBody>
+          <a:bodyPr wrap="none" rtlCol="0">
+            <a:spAutoFit/>
+          </a:bodyPr>
+          <a:lstStyle/>
+          <a:p>
+            <a:r>
+              <a:rPr lang="fr-FR" dirty="0" smtClean="0"/>
+              <a:t>Valider</a:t>
+            </a:r>
+            <a:endParaRPr lang="en-US" dirty="0"/>
+          </a:p>
+        </p:txBody>
+      </p:sp>
+      <p:sp>
+        <p:nvSpPr>
+          <p:cNvPr id="28" name="Rectangle 27"/>
+          <p:cNvSpPr/>
+          <p:nvPr/>
+        </p:nvSpPr>
+        <p:spPr>
+          <a:xfrm>
+            <a:off x="5579060" y="3744216"/>
+            <a:ext cx="1307431" cy="369332"/>
+          </a:xfrm>
+          <a:prstGeom prst="rect">
+            <a:avLst/>
+          </a:prstGeom>
+          <a:noFill/>
+        </p:spPr>
+        <p:style>
+          <a:lnRef idx="2">
+            <a:schemeClr val="accent1">
+              <a:shade val="50000"/>
+            </a:schemeClr>
+          </a:lnRef>
+          <a:fillRef idx="1">
+            <a:schemeClr val="accent1"/>
+          </a:fillRef>
+          <a:effectRef idx="0">
+            <a:schemeClr val="accent1"/>
+          </a:effectRef>
+          <a:fontRef idx="minor">
+            <a:schemeClr val="lt1"/>
+          </a:fontRef>
+        </p:style>
+        <p:txBody>
+          <a:bodyPr rtlCol="0" anchor="ctr"/>
+          <a:lstStyle/>
+          <a:p>
+            <a:pPr algn="ctr"/>
+            <a:endParaRPr lang="en-US"/>
+          </a:p>
+        </p:txBody>
+      </p:sp>
+      <p:sp>
+        <p:nvSpPr>
+          <p:cNvPr id="29" name="ZoneTexte 28"/>
+          <p:cNvSpPr txBox="1"/>
+          <p:nvPr/>
+        </p:nvSpPr>
+        <p:spPr>
+          <a:xfrm>
+            <a:off x="6556016" y="3744216"/>
+            <a:ext cx="301686" cy="369332"/>
+          </a:xfrm>
+          <a:prstGeom prst="rect">
+            <a:avLst/>
+          </a:prstGeom>
+          <a:noFill/>
+        </p:spPr>
+        <p:txBody>
+          <a:bodyPr wrap="none" rtlCol="0">
+            <a:spAutoFit/>
+          </a:bodyPr>
+          <a:lstStyle/>
+          <a:p>
+            <a:r>
+              <a:rPr lang="fr-FR" dirty="0">
+                <a:solidFill>
+                  <a:srgbClr val="FF0000"/>
+                </a:solidFill>
+              </a:rPr>
+              <a:t>4</a:t>
+            </a:r>
+            <a:endParaRPr lang="en-US" dirty="0">
+              <a:solidFill>
+                <a:srgbClr val="FF0000"/>
+              </a:solidFill>
+            </a:endParaRPr>
+          </a:p>
+        </p:txBody>
+      </p:sp>
+      <p:sp>
+        <p:nvSpPr>
+          <p:cNvPr id="30" name="ZoneTexte 29"/>
+          <p:cNvSpPr txBox="1"/>
+          <p:nvPr/>
+        </p:nvSpPr>
+        <p:spPr>
+          <a:xfrm>
+            <a:off x="5796755" y="2349926"/>
+            <a:ext cx="1217962" cy="369332"/>
+          </a:xfrm>
+          <a:prstGeom prst="rect">
+            <a:avLst/>
+          </a:prstGeom>
+          <a:noFill/>
+        </p:spPr>
+        <p:txBody>
+          <a:bodyPr wrap="none" rtlCol="0">
+            <a:spAutoFit/>
+          </a:bodyPr>
+          <a:lstStyle/>
+          <a:p>
+            <a:r>
+              <a:rPr lang="fr-FR" dirty="0" smtClean="0"/>
+              <a:t>ID véhicule</a:t>
+            </a:r>
+            <a:endParaRPr lang="en-US" dirty="0"/>
+          </a:p>
+        </p:txBody>
+      </p:sp>
+      <p:sp>
+        <p:nvSpPr>
+          <p:cNvPr id="31" name="Rectangle 30"/>
+          <p:cNvSpPr/>
+          <p:nvPr/>
+        </p:nvSpPr>
+        <p:spPr>
+          <a:xfrm>
+            <a:off x="4809408" y="2950374"/>
+            <a:ext cx="3309763" cy="369332"/>
+          </a:xfrm>
+          <a:prstGeom prst="rect">
+            <a:avLst/>
+          </a:prstGeom>
+          <a:noFill/>
+        </p:spPr>
+        <p:style>
+          <a:lnRef idx="2">
+            <a:schemeClr val="accent1">
+              <a:shade val="50000"/>
+            </a:schemeClr>
+          </a:lnRef>
+          <a:fillRef idx="1">
+            <a:schemeClr val="accent1"/>
+          </a:fillRef>
+          <a:effectRef idx="0">
+            <a:schemeClr val="accent1"/>
+          </a:effectRef>
+          <a:fontRef idx="minor">
+            <a:schemeClr val="lt1"/>
+          </a:fontRef>
+        </p:style>
+        <p:txBody>
+          <a:bodyPr rtlCol="0" anchor="ctr"/>
+          <a:lstStyle/>
+          <a:p>
+            <a:pPr algn="ctr"/>
+            <a:endParaRPr lang="en-US"/>
+          </a:p>
+        </p:txBody>
+      </p:sp>
+    </p:spTree>
+    <p:extLst>
+      <p:ext uri="{BB962C8B-B14F-4D97-AF65-F5344CB8AC3E}">
+        <p14:creationId xmlns:p14="http://schemas.microsoft.com/office/powerpoint/2010/main" val="2839130100"/>
       </p:ext>
     </p:extLst>
   </p:cSld>

</xml_diff>